<commit_message>
add anova r and spss and cohen's d for independent t-test
</commit_message>
<xml_diff>
--- a/Lecture 14_Independent t-test/Lecture 14_independent sample t test.pptx
+++ b/Lecture 14_Independent t-test/Lecture 14_independent sample t test.pptx
@@ -5,7 +5,7 @@
     <p:sldMasterId id="2147483648" r:id="rId1"/>
   </p:sldMasterIdLst>
   <p:notesMasterIdLst>
-    <p:notesMasterId r:id="rId37"/>
+    <p:notesMasterId r:id="rId38"/>
   </p:notesMasterIdLst>
   <p:sldIdLst>
     <p:sldId id="257" r:id="rId2"/>
@@ -29,20 +29,21 @@
     <p:sldId id="287" r:id="rId20"/>
     <p:sldId id="288" r:id="rId21"/>
     <p:sldId id="289" r:id="rId22"/>
-    <p:sldId id="276" r:id="rId23"/>
-    <p:sldId id="277" r:id="rId24"/>
-    <p:sldId id="278" r:id="rId25"/>
-    <p:sldId id="279" r:id="rId26"/>
-    <p:sldId id="280" r:id="rId27"/>
-    <p:sldId id="281" r:id="rId28"/>
-    <p:sldId id="294" r:id="rId29"/>
-    <p:sldId id="292" r:id="rId30"/>
-    <p:sldId id="293" r:id="rId31"/>
-    <p:sldId id="295" r:id="rId32"/>
-    <p:sldId id="296" r:id="rId33"/>
-    <p:sldId id="297" r:id="rId34"/>
-    <p:sldId id="291" r:id="rId35"/>
-    <p:sldId id="290" r:id="rId36"/>
+    <p:sldId id="298" r:id="rId23"/>
+    <p:sldId id="276" r:id="rId24"/>
+    <p:sldId id="277" r:id="rId25"/>
+    <p:sldId id="278" r:id="rId26"/>
+    <p:sldId id="279" r:id="rId27"/>
+    <p:sldId id="280" r:id="rId28"/>
+    <p:sldId id="281" r:id="rId29"/>
+    <p:sldId id="294" r:id="rId30"/>
+    <p:sldId id="292" r:id="rId31"/>
+    <p:sldId id="293" r:id="rId32"/>
+    <p:sldId id="295" r:id="rId33"/>
+    <p:sldId id="296" r:id="rId34"/>
+    <p:sldId id="297" r:id="rId35"/>
+    <p:sldId id="291" r:id="rId36"/>
+    <p:sldId id="290" r:id="rId37"/>
   </p:sldIdLst>
   <p:sldSz cx="9144000" cy="6858000" type="screen4x3"/>
   <p:notesSz cx="6858000" cy="9144000"/>
@@ -143,7 +144,7 @@
   </p:defaultTextStyle>
   <p:extLst>
     <p:ext uri="{EFAFB233-063F-42B5-8137-9DF3F51BA10A}">
-      <p15:sldGuideLst xmlns:p15="http://schemas.microsoft.com/office/powerpoint/2012/main" xmlns="">
+      <p15:sldGuideLst xmlns="" xmlns:p15="http://schemas.microsoft.com/office/powerpoint/2012/main">
         <p15:guide id="1" orient="horz" pos="2160">
           <p15:clr>
             <a:srgbClr val="A4A3A4"/>
@@ -242,7 +243,7 @@
           <a:p>
             <a:fld id="{FEC7DD3E-9152-40F7-8222-8E14FA855B8F}" type="datetimeFigureOut">
               <a:rPr lang="en-US" smtClean="0"/>
-              <a:t>4/10/18</a:t>
+              <a:t>4/12/18</a:t>
             </a:fld>
             <a:endParaRPr lang="en-US"/>
           </a:p>
@@ -958,56 +959,70 @@
       </p:grpSpPr>
       <p:sp>
         <p:nvSpPr>
-          <p:cNvPr id="53250" name="Rectangle 2"/>
-          <p:cNvSpPr>
-            <a:spLocks noGrp="1" noRot="1" noChangeAspect="1" noChangeArrowheads="1" noTextEdit="1"/>
+          <p:cNvPr id="2" name="Slide Image Placeholder 1"/>
+          <p:cNvSpPr>
+            <a:spLocks noGrp="1" noRot="1" noChangeAspect="1"/>
           </p:cNvSpPr>
           <p:nvPr>
             <p:ph type="sldImg"/>
           </p:nvPr>
         </p:nvSpPr>
-        <p:spPr>
-          <a:ln/>
-        </p:spPr>
-      </p:sp>
-      <p:sp>
-        <p:nvSpPr>
-          <p:cNvPr id="53251" name="Rectangle 3"/>
-          <p:cNvSpPr>
-            <a:spLocks noGrp="1" noChangeArrowheads="1"/>
+        <p:spPr/>
+      </p:sp>
+      <p:sp>
+        <p:nvSpPr>
+          <p:cNvPr id="3" name="Notes Placeholder 2"/>
+          <p:cNvSpPr>
+            <a:spLocks noGrp="1"/>
           </p:cNvSpPr>
           <p:nvPr>
             <p:ph type="body" idx="1"/>
           </p:nvPr>
         </p:nvSpPr>
-        <p:spPr>
-          <a:noFill/>
-          <a:ln/>
-          <a:extLst>
-            <a:ext uri="{909E8E84-426E-40dd-AFC4-6F175D3DCCD1}">
-              <a14:hiddenFill xmlns:a14="http://schemas.microsoft.com/office/drawing/2010/main">
-                <a:solidFill>
-                  <a:srgbClr val="FFFFFF"/>
-                </a:solidFill>
-              </a14:hiddenFill>
-            </a:ext>
-            <a:ext uri="{91240B29-F687-4f45-9708-019B960494DF}">
-              <a14:hiddenLine xmlns:a14="http://schemas.microsoft.com/office/drawing/2010/main" w="9525">
-                <a:solidFill>
-                  <a:srgbClr val="000000"/>
-                </a:solidFill>
-                <a:miter lim="800000"/>
-                <a:headEnd/>
-                <a:tailEnd/>
-              </a14:hiddenLine>
-            </a:ext>
-          </a:extLst>
-        </p:spPr>
+        <p:spPr/>
         <p:txBody>
           <a:bodyPr/>
           <a:lstStyle/>
           <a:p>
-            <a:pPr eaLnBrk="1" hangingPunct="1"/>
+            <a:r>
+              <a:rPr lang="en-US" dirty="0" smtClean="0"/>
+              <a:t>https://</a:t>
+            </a:r>
+            <a:r>
+              <a:rPr lang="en-US" dirty="0" err="1" smtClean="0"/>
+              <a:t>i.ytimg.com</a:t>
+            </a:r>
+            <a:r>
+              <a:rPr lang="en-US" dirty="0" smtClean="0"/>
+              <a:t>/vi/wGlbyNBxEM8/</a:t>
+            </a:r>
+            <a:r>
+              <a:rPr lang="en-US" smtClean="0"/>
+              <a:t>maxresdefault.jpg</a:t>
+            </a:r>
+            <a:endParaRPr lang="en-US" dirty="0"/>
+          </a:p>
+        </p:txBody>
+      </p:sp>
+      <p:sp>
+        <p:nvSpPr>
+          <p:cNvPr id="4" name="Slide Number Placeholder 3"/>
+          <p:cNvSpPr>
+            <a:spLocks noGrp="1"/>
+          </p:cNvSpPr>
+          <p:nvPr>
+            <p:ph type="sldNum" sz="quarter" idx="10"/>
+          </p:nvPr>
+        </p:nvSpPr>
+        <p:spPr/>
+        <p:txBody>
+          <a:bodyPr/>
+          <a:lstStyle/>
+          <a:p>
+            <a:fld id="{2D175169-D753-49F3-A74C-AACC6E31DCAF}" type="slidenum">
+              <a:rPr lang="en-US" smtClean="0"/>
+              <a:t>22</a:t>
+            </a:fld>
             <a:endParaRPr lang="en-US"/>
           </a:p>
         </p:txBody>
@@ -1015,7 +1030,7 @@
     </p:spTree>
     <p:extLst>
       <p:ext uri="{BB962C8B-B14F-4D97-AF65-F5344CB8AC3E}">
-        <p14:creationId xmlns:p14="http://schemas.microsoft.com/office/powerpoint/2010/main" val="195763066"/>
+        <p14:creationId xmlns:p14="http://schemas.microsoft.com/office/powerpoint/2010/main" val="2450197495"/>
       </p:ext>
     </p:extLst>
   </p:cSld>
@@ -1044,7 +1059,7 @@
       </p:grpSpPr>
       <p:sp>
         <p:nvSpPr>
-          <p:cNvPr id="54274" name="Rectangle 2"/>
+          <p:cNvPr id="53250" name="Rectangle 2"/>
           <p:cNvSpPr>
             <a:spLocks noGrp="1" noRot="1" noChangeAspect="1" noChangeArrowheads="1" noTextEdit="1"/>
           </p:cNvSpPr>
@@ -1058,7 +1073,7 @@
       </p:sp>
       <p:sp>
         <p:nvSpPr>
-          <p:cNvPr id="54275" name="Rectangle 3"/>
+          <p:cNvPr id="53251" name="Rectangle 3"/>
           <p:cNvSpPr>
             <a:spLocks noGrp="1" noChangeArrowheads="1"/>
           </p:cNvSpPr>
@@ -1101,7 +1116,7 @@
     </p:spTree>
     <p:extLst>
       <p:ext uri="{BB962C8B-B14F-4D97-AF65-F5344CB8AC3E}">
-        <p14:creationId xmlns:p14="http://schemas.microsoft.com/office/powerpoint/2010/main" val="1570565574"/>
+        <p14:creationId xmlns:p14="http://schemas.microsoft.com/office/powerpoint/2010/main" val="195763066"/>
       </p:ext>
     </p:extLst>
   </p:cSld>
@@ -1130,7 +1145,7 @@
       </p:grpSpPr>
       <p:sp>
         <p:nvSpPr>
-          <p:cNvPr id="55298" name="Rectangle 2"/>
+          <p:cNvPr id="54274" name="Rectangle 2"/>
           <p:cNvSpPr>
             <a:spLocks noGrp="1" noRot="1" noChangeAspect="1" noChangeArrowheads="1" noTextEdit="1"/>
           </p:cNvSpPr>
@@ -1144,7 +1159,7 @@
       </p:sp>
       <p:sp>
         <p:nvSpPr>
-          <p:cNvPr id="55299" name="Rectangle 3"/>
+          <p:cNvPr id="54275" name="Rectangle 3"/>
           <p:cNvSpPr>
             <a:spLocks noGrp="1" noChangeArrowheads="1"/>
           </p:cNvSpPr>
@@ -1187,7 +1202,7 @@
     </p:spTree>
     <p:extLst>
       <p:ext uri="{BB962C8B-B14F-4D97-AF65-F5344CB8AC3E}">
-        <p14:creationId xmlns:p14="http://schemas.microsoft.com/office/powerpoint/2010/main" val="3702056683"/>
+        <p14:creationId xmlns:p14="http://schemas.microsoft.com/office/powerpoint/2010/main" val="1570565574"/>
       </p:ext>
     </p:extLst>
   </p:cSld>
@@ -1216,7 +1231,7 @@
       </p:grpSpPr>
       <p:sp>
         <p:nvSpPr>
-          <p:cNvPr id="56322" name="Rectangle 2"/>
+          <p:cNvPr id="55298" name="Rectangle 2"/>
           <p:cNvSpPr>
             <a:spLocks noGrp="1" noRot="1" noChangeAspect="1" noChangeArrowheads="1" noTextEdit="1"/>
           </p:cNvSpPr>
@@ -1230,7 +1245,7 @@
       </p:sp>
       <p:sp>
         <p:nvSpPr>
-          <p:cNvPr id="56323" name="Rectangle 3"/>
+          <p:cNvPr id="55299" name="Rectangle 3"/>
           <p:cNvSpPr>
             <a:spLocks noGrp="1" noChangeArrowheads="1"/>
           </p:cNvSpPr>
@@ -1273,7 +1288,7 @@
     </p:spTree>
     <p:extLst>
       <p:ext uri="{BB962C8B-B14F-4D97-AF65-F5344CB8AC3E}">
-        <p14:creationId xmlns:p14="http://schemas.microsoft.com/office/powerpoint/2010/main" val="2063025714"/>
+        <p14:creationId xmlns:p14="http://schemas.microsoft.com/office/powerpoint/2010/main" val="3702056683"/>
       </p:ext>
     </p:extLst>
   </p:cSld>
@@ -1302,7 +1317,7 @@
       </p:grpSpPr>
       <p:sp>
         <p:nvSpPr>
-          <p:cNvPr id="57346" name="Rectangle 2"/>
+          <p:cNvPr id="56322" name="Rectangle 2"/>
           <p:cNvSpPr>
             <a:spLocks noGrp="1" noRot="1" noChangeAspect="1" noChangeArrowheads="1" noTextEdit="1"/>
           </p:cNvSpPr>
@@ -1316,7 +1331,7 @@
       </p:sp>
       <p:sp>
         <p:nvSpPr>
-          <p:cNvPr id="57347" name="Rectangle 3"/>
+          <p:cNvPr id="56323" name="Rectangle 3"/>
           <p:cNvSpPr>
             <a:spLocks noGrp="1" noChangeArrowheads="1"/>
           </p:cNvSpPr>
@@ -1359,7 +1374,7 @@
     </p:spTree>
     <p:extLst>
       <p:ext uri="{BB962C8B-B14F-4D97-AF65-F5344CB8AC3E}">
-        <p14:creationId xmlns:p14="http://schemas.microsoft.com/office/powerpoint/2010/main" val="3583481802"/>
+        <p14:creationId xmlns:p14="http://schemas.microsoft.com/office/powerpoint/2010/main" val="2063025714"/>
       </p:ext>
     </p:extLst>
   </p:cSld>
@@ -1388,7 +1403,7 @@
       </p:grpSpPr>
       <p:sp>
         <p:nvSpPr>
-          <p:cNvPr id="58370" name="Rectangle 2"/>
+          <p:cNvPr id="57346" name="Rectangle 2"/>
           <p:cNvSpPr>
             <a:spLocks noGrp="1" noRot="1" noChangeAspect="1" noChangeArrowheads="1" noTextEdit="1"/>
           </p:cNvSpPr>
@@ -1402,7 +1417,7 @@
       </p:sp>
       <p:sp>
         <p:nvSpPr>
-          <p:cNvPr id="58371" name="Rectangle 3"/>
+          <p:cNvPr id="57347" name="Rectangle 3"/>
           <p:cNvSpPr>
             <a:spLocks noGrp="1" noChangeArrowheads="1"/>
           </p:cNvSpPr>
@@ -1445,7 +1460,7 @@
     </p:spTree>
     <p:extLst>
       <p:ext uri="{BB962C8B-B14F-4D97-AF65-F5344CB8AC3E}">
-        <p14:creationId xmlns:p14="http://schemas.microsoft.com/office/powerpoint/2010/main" val="2665928564"/>
+        <p14:creationId xmlns:p14="http://schemas.microsoft.com/office/powerpoint/2010/main" val="3583481802"/>
       </p:ext>
     </p:extLst>
   </p:cSld>
@@ -1532,6 +1547,92 @@
     <p:extLst>
       <p:ext uri="{BB962C8B-B14F-4D97-AF65-F5344CB8AC3E}">
         <p14:creationId xmlns:p14="http://schemas.microsoft.com/office/powerpoint/2010/main" val="898770582"/>
+      </p:ext>
+    </p:extLst>
+  </p:cSld>
+  <p:clrMapOvr>
+    <a:masterClrMapping/>
+  </p:clrMapOvr>
+</p:notes>
+</file>
+
+<file path=ppt/notesSlides/notesSlide20.xml><?xml version="1.0" encoding="utf-8"?>
+<p:notes xmlns:a="http://schemas.openxmlformats.org/drawingml/2006/main" xmlns:r="http://schemas.openxmlformats.org/officeDocument/2006/relationships" xmlns:p="http://schemas.openxmlformats.org/presentationml/2006/main">
+  <p:cSld>
+    <p:spTree>
+      <p:nvGrpSpPr>
+        <p:cNvPr id="1" name=""/>
+        <p:cNvGrpSpPr/>
+        <p:nvPr/>
+      </p:nvGrpSpPr>
+      <p:grpSpPr>
+        <a:xfrm>
+          <a:off x="0" y="0"/>
+          <a:ext cx="0" cy="0"/>
+          <a:chOff x="0" y="0"/>
+          <a:chExt cx="0" cy="0"/>
+        </a:xfrm>
+      </p:grpSpPr>
+      <p:sp>
+        <p:nvSpPr>
+          <p:cNvPr id="58370" name="Rectangle 2"/>
+          <p:cNvSpPr>
+            <a:spLocks noGrp="1" noRot="1" noChangeAspect="1" noChangeArrowheads="1" noTextEdit="1"/>
+          </p:cNvSpPr>
+          <p:nvPr>
+            <p:ph type="sldImg"/>
+          </p:nvPr>
+        </p:nvSpPr>
+        <p:spPr>
+          <a:ln/>
+        </p:spPr>
+      </p:sp>
+      <p:sp>
+        <p:nvSpPr>
+          <p:cNvPr id="58371" name="Rectangle 3"/>
+          <p:cNvSpPr>
+            <a:spLocks noGrp="1" noChangeArrowheads="1"/>
+          </p:cNvSpPr>
+          <p:nvPr>
+            <p:ph type="body" idx="1"/>
+          </p:nvPr>
+        </p:nvSpPr>
+        <p:spPr>
+          <a:noFill/>
+          <a:ln/>
+          <a:extLst>
+            <a:ext uri="{909E8E84-426E-40dd-AFC4-6F175D3DCCD1}">
+              <a14:hiddenFill xmlns:a14="http://schemas.microsoft.com/office/drawing/2010/main">
+                <a:solidFill>
+                  <a:srgbClr val="FFFFFF"/>
+                </a:solidFill>
+              </a14:hiddenFill>
+            </a:ext>
+            <a:ext uri="{91240B29-F687-4f45-9708-019B960494DF}">
+              <a14:hiddenLine xmlns:a14="http://schemas.microsoft.com/office/drawing/2010/main" w="9525">
+                <a:solidFill>
+                  <a:srgbClr val="000000"/>
+                </a:solidFill>
+                <a:miter lim="800000"/>
+                <a:headEnd/>
+                <a:tailEnd/>
+              </a14:hiddenLine>
+            </a:ext>
+          </a:extLst>
+        </p:spPr>
+        <p:txBody>
+          <a:bodyPr/>
+          <a:lstStyle/>
+          <a:p>
+            <a:pPr eaLnBrk="1" hangingPunct="1"/>
+            <a:endParaRPr lang="en-US"/>
+          </a:p>
+        </p:txBody>
+      </p:sp>
+    </p:spTree>
+    <p:extLst>
+      <p:ext uri="{BB962C8B-B14F-4D97-AF65-F5344CB8AC3E}">
+        <p14:creationId xmlns:p14="http://schemas.microsoft.com/office/powerpoint/2010/main" val="2665928564"/>
       </p:ext>
     </p:extLst>
   </p:cSld>
@@ -2322,7 +2423,7 @@
           <a:p>
             <a:fld id="{D1B8BF54-6F96-4B6E-A8E8-549335A3310C}" type="datetime1">
               <a:rPr lang="en-US" smtClean="0"/>
-              <a:t>4/10/18</a:t>
+              <a:t>4/12/18</a:t>
             </a:fld>
             <a:endParaRPr lang="en-US"/>
           </a:p>
@@ -2490,7 +2591,7 @@
           <a:p>
             <a:fld id="{3F5DA39C-9B80-4C8D-82D9-6A7A3621C492}" type="datetime1">
               <a:rPr lang="en-US" smtClean="0"/>
-              <a:t>4/10/18</a:t>
+              <a:t>4/12/18</a:t>
             </a:fld>
             <a:endParaRPr lang="en-US"/>
           </a:p>
@@ -2668,7 +2769,7 @@
           <a:p>
             <a:fld id="{93E657DF-A16C-4E70-B78B-E6E8E69BB955}" type="datetime1">
               <a:rPr lang="en-US" smtClean="0"/>
-              <a:t>4/10/18</a:t>
+              <a:t>4/12/18</a:t>
             </a:fld>
             <a:endParaRPr lang="en-US"/>
           </a:p>
@@ -2836,7 +2937,7 @@
           <a:p>
             <a:fld id="{E9997D52-121E-4977-9936-B99034F70F3E}" type="datetime1">
               <a:rPr lang="en-US" smtClean="0"/>
-              <a:t>4/10/18</a:t>
+              <a:t>4/12/18</a:t>
             </a:fld>
             <a:endParaRPr lang="en-US"/>
           </a:p>
@@ -3081,7 +3182,7 @@
           <a:p>
             <a:fld id="{6820AEC1-F4C7-4888-9D6D-EE0CA1034EC9}" type="datetime1">
               <a:rPr lang="en-US" smtClean="0"/>
-              <a:t>4/10/18</a:t>
+              <a:t>4/12/18</a:t>
             </a:fld>
             <a:endParaRPr lang="en-US"/>
           </a:p>
@@ -3366,7 +3467,7 @@
           <a:p>
             <a:fld id="{A2C9DCC9-0F48-4201-865D-B2E7DB732E4D}" type="datetime1">
               <a:rPr lang="en-US" smtClean="0"/>
-              <a:t>4/10/18</a:t>
+              <a:t>4/12/18</a:t>
             </a:fld>
             <a:endParaRPr lang="en-US"/>
           </a:p>
@@ -3785,7 +3886,7 @@
           <a:p>
             <a:fld id="{4A2E3054-D25E-440C-A294-C55FE21EF66C}" type="datetime1">
               <a:rPr lang="en-US" smtClean="0"/>
-              <a:t>4/10/18</a:t>
+              <a:t>4/12/18</a:t>
             </a:fld>
             <a:endParaRPr lang="en-US"/>
           </a:p>
@@ -3902,7 +4003,7 @@
           <a:p>
             <a:fld id="{6B7E2D6D-E80C-4177-A96E-051A89AA9996}" type="datetime1">
               <a:rPr lang="en-US" smtClean="0"/>
-              <a:t>4/10/18</a:t>
+              <a:t>4/12/18</a:t>
             </a:fld>
             <a:endParaRPr lang="en-US"/>
           </a:p>
@@ -3997,7 +4098,7 @@
           <a:p>
             <a:fld id="{00969348-B08C-4CFB-A56A-DCFF204B2FC8}" type="datetime1">
               <a:rPr lang="en-US" smtClean="0"/>
-              <a:t>4/10/18</a:t>
+              <a:t>4/12/18</a:t>
             </a:fld>
             <a:endParaRPr lang="en-US"/>
           </a:p>
@@ -4272,7 +4373,7 @@
           <a:p>
             <a:fld id="{E2C693CF-32E2-4511-B58C-10DE3092CDC8}" type="datetime1">
               <a:rPr lang="en-US" smtClean="0"/>
-              <a:t>4/10/18</a:t>
+              <a:t>4/12/18</a:t>
             </a:fld>
             <a:endParaRPr lang="en-US"/>
           </a:p>
@@ -4524,7 +4625,7 @@
           <a:p>
             <a:fld id="{CE9C2D1E-EC92-4524-B468-85987A9B61E7}" type="datetime1">
               <a:rPr lang="en-US" smtClean="0"/>
-              <a:t>4/10/18</a:t>
+              <a:t>4/12/18</a:t>
             </a:fld>
             <a:endParaRPr lang="en-US"/>
           </a:p>
@@ -4735,7 +4836,7 @@
           <a:p>
             <a:fld id="{6C7A74B8-68D0-455F-82AA-86C17831DE84}" type="datetime1">
               <a:rPr lang="en-US" smtClean="0"/>
-              <a:t>4/10/18</a:t>
+              <a:t>4/12/18</a:t>
             </a:fld>
             <a:endParaRPr lang="en-US"/>
           </a:p>
@@ -5417,7 +5518,7 @@
             </p:spPr>
             <p:txBody>
               <a:bodyPr>
-                <a:normAutofit fontScale="92500"/>
+                <a:normAutofit/>
               </a:bodyPr>
               <a:lstStyle/>
               <a:p>
@@ -5477,21 +5578,8 @@
                     <a:latin typeface="Palatino Linotype" pitchFamily="18" charset="0"/>
                     <a:ea typeface="宋体" pitchFamily="2" charset="-122"/>
                   </a:rPr>
-                  <a:t>:  </a:t>
+                  <a:t>:  -</a:t>
                 </a:r>
-                <a14:m/>
-                <a:r>
-                  <a:rPr lang="en-US" altLang="zh-CN" sz="2400" dirty="0">
-                    <a:latin typeface="Palatino Linotype" pitchFamily="18" charset="0"/>
-                    <a:ea typeface="宋体" pitchFamily="2" charset="-122"/>
-                  </a:rPr>
-                  <a:t>-</a:t>
-                </a:r>
-                <a14:m/>
-                <a:endParaRPr lang="en-US" altLang="zh-CN" sz="2400" dirty="0">
-                  <a:latin typeface="Palatino Linotype" pitchFamily="18" charset="0"/>
-                  <a:ea typeface="宋体" pitchFamily="2" charset="-122"/>
-                </a:endParaRPr>
               </a:p>
               <a:p>
                 <a:pPr marL="0" indent="0">
@@ -5533,17 +5621,8 @@
                     <a:latin typeface="Palatino Linotype" pitchFamily="18" charset="0"/>
                     <a:ea typeface="宋体" pitchFamily="2" charset="-122"/>
                   </a:rPr>
-                  <a:t>which define the sampling distribution of </a:t>
+                  <a:t>which define the sampling distribution of -</a:t>
                 </a:r>
-                <a14:m/>
-                <a:r>
-                  <a:rPr lang="en-US" altLang="zh-CN" sz="2400" dirty="0">
-                    <a:latin typeface="Palatino Linotype" pitchFamily="18" charset="0"/>
-                    <a:ea typeface="宋体" pitchFamily="2" charset="-122"/>
-                  </a:rPr>
-                  <a:t>-</a:t>
-                </a:r>
-                <a14:m/>
                 <a:endParaRPr lang="en-US" altLang="zh-CN" sz="2400" b="0" dirty="0">
                   <a:latin typeface="Palatino Linotype" pitchFamily="18" charset="0"/>
                   <a:ea typeface="宋体" pitchFamily="2" charset="-122"/>
@@ -5560,23 +5639,7 @@
                     <a:latin typeface="Palatino Linotype" pitchFamily="18" charset="0"/>
                     <a:ea typeface="宋体" pitchFamily="2" charset="-122"/>
                   </a:rPr>
-                  <a:t>The distribution of  </a:t>
-                </a:r>
-                <a14:m/>
-                <a:r>
-                  <a:rPr lang="en-US" altLang="zh-CN" sz="2400" dirty="0">
-                    <a:latin typeface="Palatino Linotype" pitchFamily="18" charset="0"/>
-                    <a:ea typeface="宋体" pitchFamily="2" charset="-122"/>
-                  </a:rPr>
-                  <a:t>-</a:t>
-                </a:r>
-                <a14:m/>
-                <a:r>
-                  <a:rPr lang="en-US" altLang="zh-CN" sz="2400" dirty="0">
-                    <a:latin typeface="Palatino Linotype" pitchFamily="18" charset="0"/>
-                    <a:ea typeface="宋体" pitchFamily="2" charset="-122"/>
-                  </a:rPr>
-                  <a:t> is normally distributed</a:t>
+                  <a:t>The distribution of  - is normally distributed</a:t>
                 </a:r>
               </a:p>
               <a:p>
@@ -6111,7 +6174,7 @@
           <a:graphicData uri="http://schemas.openxmlformats.org/presentationml/2006/ole">
             <mc:AlternateContent xmlns:mc="http://schemas.openxmlformats.org/markup-compatibility/2006">
               <mc:Choice xmlns:v="urn:schemas-microsoft-com:vml" Requires="v">
-                <p:oleObj spid="_x0000_s2198" name="Equation" r:id="rId5" imgW="1028520" imgH="241200" progId="Equation.3">
+                <p:oleObj spid="_x0000_s2209" name="Equation" r:id="rId5" imgW="1028520" imgH="241200" progId="Equation.3">
                   <p:embed/>
                 </p:oleObj>
               </mc:Choice>
@@ -6239,7 +6302,7 @@
           <a:graphicData uri="http://schemas.openxmlformats.org/presentationml/2006/ole">
             <mc:AlternateContent xmlns:mc="http://schemas.openxmlformats.org/markup-compatibility/2006">
               <mc:Choice xmlns:v="urn:schemas-microsoft-com:vml" Requires="v">
-                <p:oleObj spid="_x0000_s2199" name="Equation" r:id="rId7" imgW="1231560" imgH="495000" progId="Equation.DSMT4">
+                <p:oleObj spid="_x0000_s2210" name="Equation" r:id="rId7" imgW="1231560" imgH="495000" progId="Equation.DSMT4">
                   <p:embed/>
                 </p:oleObj>
               </mc:Choice>
@@ -6558,7 +6621,7 @@
           <a:graphicData uri="http://schemas.openxmlformats.org/presentationml/2006/ole">
             <mc:AlternateContent xmlns:mc="http://schemas.openxmlformats.org/markup-compatibility/2006">
               <mc:Choice xmlns:v="urn:schemas-microsoft-com:vml" Requires="v">
-                <p:oleObj spid="_x0000_s3289" name="Equation" r:id="rId4" imgW="215806" imgH="228501" progId="Equation.DSMT4">
+                <p:oleObj spid="_x0000_s3305" name="Equation" r:id="rId4" imgW="215806" imgH="228501" progId="Equation.DSMT4">
                   <p:embed/>
                 </p:oleObj>
               </mc:Choice>
@@ -6686,7 +6749,7 @@
           <a:graphicData uri="http://schemas.openxmlformats.org/presentationml/2006/ole">
             <mc:AlternateContent xmlns:mc="http://schemas.openxmlformats.org/markup-compatibility/2006">
               <mc:Choice xmlns:v="urn:schemas-microsoft-com:vml" Requires="v">
-                <p:oleObj spid="_x0000_s3290" name="Equation" r:id="rId6" imgW="215806" imgH="228501" progId="Equation.DSMT4">
+                <p:oleObj spid="_x0000_s3306" name="Equation" r:id="rId6" imgW="215806" imgH="228501" progId="Equation.DSMT4">
                   <p:embed/>
                 </p:oleObj>
               </mc:Choice>
@@ -6814,7 +6877,7 @@
           <a:graphicData uri="http://schemas.openxmlformats.org/presentationml/2006/ole">
             <mc:AlternateContent xmlns:mc="http://schemas.openxmlformats.org/markup-compatibility/2006">
               <mc:Choice xmlns:v="urn:schemas-microsoft-com:vml" Requires="v">
-                <p:oleObj spid="_x0000_s3291" name="Equation" r:id="rId8" imgW="1130040" imgH="495000" progId="Equation.DSMT4">
+                <p:oleObj spid="_x0000_s3307" name="Equation" r:id="rId8" imgW="1130040" imgH="495000" progId="Equation.DSMT4">
                   <p:embed/>
                 </p:oleObj>
               </mc:Choice>
@@ -7483,7 +7546,7 @@
           <a:graphicData uri="http://schemas.openxmlformats.org/presentationml/2006/ole">
             <mc:AlternateContent xmlns:mc="http://schemas.openxmlformats.org/markup-compatibility/2006">
               <mc:Choice xmlns:v="urn:schemas-microsoft-com:vml" Requires="v">
-                <p:oleObj spid="_x0000_s4166" name="Equation" r:id="rId4" imgW="520560" imgH="241200" progId="Equation.DSMT4">
+                <p:oleObj spid="_x0000_s4172" name="Equation" r:id="rId4" imgW="520560" imgH="241200" progId="Equation.DSMT4">
                   <p:embed/>
                 </p:oleObj>
               </mc:Choice>
@@ -7655,7 +7718,7 @@
             </p:spPr>
             <p:txBody>
               <a:bodyPr>
-                <a:normAutofit lnSpcReduction="10000"/>
+                <a:normAutofit/>
               </a:bodyPr>
               <a:lstStyle/>
               <a:p>
@@ -7693,29 +7756,7 @@
                     <a:latin typeface="Palatino Linotype" pitchFamily="18" charset="0"/>
                     <a:ea typeface="宋体" pitchFamily="2" charset="-122"/>
                   </a:rPr>
-                  <a:t>When sample sizes are equal we can overlook assumption 3.  In other words if </a:t>
-                </a:r>
-                <a14:m/>
-                <a:r>
-                  <a:rPr lang="en-US" altLang="zh-CN" sz="2400" dirty="0">
-                    <a:solidFill>
-                      <a:schemeClr val="tx1"/>
-                    </a:solidFill>
-                    <a:latin typeface="Palatino Linotype" pitchFamily="18" charset="0"/>
-                    <a:ea typeface="宋体" pitchFamily="2" charset="-122"/>
-                  </a:rPr>
-                  <a:t>= </a:t>
-                </a:r>
-                <a14:m/>
-                <a:r>
-                  <a:rPr lang="en-US" altLang="zh-CN" sz="2400" dirty="0">
-                    <a:solidFill>
-                      <a:schemeClr val="tx1"/>
-                    </a:solidFill>
-                    <a:latin typeface="Palatino Linotype" pitchFamily="18" charset="0"/>
-                    <a:ea typeface="宋体" pitchFamily="2" charset="-122"/>
-                  </a:rPr>
-                  <a:t>, then we don’t care if the variances are equal, we can proceed with this test. Otherwise….</a:t>
+                  <a:t>When sample sizes are equal we can overlook assumption 3.  In other words if = , then we don’t care if the variances are equal, we can proceed with this test. Otherwise….</a:t>
                 </a:r>
               </a:p>
               <a:p>
@@ -8930,7 +8971,7 @@
           <a:graphicData uri="http://schemas.openxmlformats.org/presentationml/2006/ole">
             <mc:AlternateContent xmlns:mc="http://schemas.openxmlformats.org/markup-compatibility/2006">
               <mc:Choice xmlns:v="urn:schemas-microsoft-com:vml" Requires="v">
-                <p:oleObj spid="_x0000_s5258" name="Equation" r:id="rId4" imgW="177569" imgH="253670" progId="Equation.3">
+                <p:oleObj spid="_x0000_s5269" name="Equation" r:id="rId4" imgW="177569" imgH="253670" progId="Equation.3">
                   <p:embed/>
                 </p:oleObj>
               </mc:Choice>
@@ -9056,7 +9097,7 @@
           <a:graphicData uri="http://schemas.openxmlformats.org/presentationml/2006/ole">
             <mc:AlternateContent xmlns:mc="http://schemas.openxmlformats.org/markup-compatibility/2006">
               <mc:Choice xmlns:v="urn:schemas-microsoft-com:vml" Requires="v">
-                <p:oleObj spid="_x0000_s5259" name="Equation" r:id="rId6" imgW="1650960" imgH="469800" progId="Equation.DSMT4">
+                <p:oleObj spid="_x0000_s5270" name="Equation" r:id="rId6" imgW="1650960" imgH="469800" progId="Equation.DSMT4">
                   <p:embed/>
                 </p:oleObj>
               </mc:Choice>
@@ -9664,7 +9705,7 @@
           <a:graphicData uri="http://schemas.openxmlformats.org/presentationml/2006/ole">
             <mc:AlternateContent xmlns:mc="http://schemas.openxmlformats.org/markup-compatibility/2006">
               <mc:Choice xmlns:v="urn:schemas-microsoft-com:vml" Requires="v">
-                <p:oleObj spid="_x0000_s6339" name="Equation" r:id="rId4" imgW="380880" imgH="253800" progId="Equation.DSMT4">
+                <p:oleObj spid="_x0000_s6355" name="Equation" r:id="rId4" imgW="380880" imgH="253800" progId="Equation.DSMT4">
                   <p:embed/>
                 </p:oleObj>
               </mc:Choice>
@@ -9786,7 +9827,7 @@
           <a:graphicData uri="http://schemas.openxmlformats.org/presentationml/2006/ole">
             <mc:AlternateContent xmlns:mc="http://schemas.openxmlformats.org/markup-compatibility/2006">
               <mc:Choice xmlns:v="urn:schemas-microsoft-com:vml" Requires="v">
-                <p:oleObj spid="_x0000_s6340" name="Equation" r:id="rId6" imgW="520560" imgH="241200" progId="Equation.DSMT4">
+                <p:oleObj spid="_x0000_s6356" name="Equation" r:id="rId6" imgW="520560" imgH="241200" progId="Equation.DSMT4">
                   <p:embed/>
                 </p:oleObj>
               </mc:Choice>
@@ -9908,7 +9949,7 @@
           <a:graphicData uri="http://schemas.openxmlformats.org/presentationml/2006/ole">
             <mc:AlternateContent xmlns:mc="http://schemas.openxmlformats.org/markup-compatibility/2006">
               <mc:Choice xmlns:v="urn:schemas-microsoft-com:vml" Requires="v">
-                <p:oleObj spid="_x0000_s6341" name="Equation" r:id="rId8" imgW="1117440" imgH="520560" progId="Equation.DSMT4">
+                <p:oleObj spid="_x0000_s6357" name="Equation" r:id="rId8" imgW="1117440" imgH="520560" progId="Equation.DSMT4">
                   <p:embed/>
                 </p:oleObj>
               </mc:Choice>
@@ -10267,7 +10308,7 @@
           <a:graphicData uri="http://schemas.openxmlformats.org/presentationml/2006/ole">
             <mc:AlternateContent xmlns:mc="http://schemas.openxmlformats.org/markup-compatibility/2006">
               <mc:Choice xmlns:v="urn:schemas-microsoft-com:vml" Requires="v">
-                <p:oleObj spid="_x0000_s8260" name="Equation" r:id="rId3" imgW="1650960" imgH="711000" progId="Equation.DSMT4">
+                <p:oleObj spid="_x0000_s8266" name="Equation" r:id="rId3" imgW="1650960" imgH="711000" progId="Equation.DSMT4">
                   <p:embed/>
                 </p:oleObj>
               </mc:Choice>
@@ -11642,6 +11683,284 @@
       </p:grpSpPr>
       <p:sp>
         <p:nvSpPr>
+          <p:cNvPr id="2" name="Title 1"/>
+          <p:cNvSpPr>
+            <a:spLocks noGrp="1"/>
+          </p:cNvSpPr>
+          <p:nvPr>
+            <p:ph type="title"/>
+          </p:nvPr>
+        </p:nvSpPr>
+        <p:spPr/>
+        <p:txBody>
+          <a:bodyPr/>
+          <a:lstStyle/>
+          <a:p>
+            <a:r>
+              <a:rPr lang="en-US" dirty="0" smtClean="0"/>
+              <a:t>Effect</a:t>
+            </a:r>
+            <a:r>
+              <a:rPr lang="en-US" dirty="0" smtClean="0"/>
+              <a:t> Size</a:t>
+            </a:r>
+            <a:endParaRPr lang="en-US" dirty="0"/>
+          </a:p>
+        </p:txBody>
+      </p:sp>
+      <p:sp>
+        <p:nvSpPr>
+          <p:cNvPr id="3" name="Content Placeholder 2"/>
+          <p:cNvSpPr>
+            <a:spLocks noGrp="1"/>
+          </p:cNvSpPr>
+          <p:nvPr>
+            <p:ph idx="1"/>
+          </p:nvPr>
+        </p:nvSpPr>
+        <p:spPr/>
+        <p:txBody>
+          <a:bodyPr/>
+          <a:lstStyle/>
+          <a:p>
+            <a:r>
+              <a:rPr lang="en-US" dirty="0" smtClean="0"/>
+              <a:t>Cohen’s</a:t>
+            </a:r>
+            <a:r>
+              <a:rPr lang="zh-CN" altLang="en-US" dirty="0" smtClean="0"/>
+              <a:t> </a:t>
+            </a:r>
+            <a:r>
+              <a:rPr lang="en-US" altLang="zh-CN" i="1" dirty="0" smtClean="0"/>
+              <a:t>d</a:t>
+            </a:r>
+            <a:r>
+              <a:rPr lang="zh-CN" altLang="en-US" i="1" dirty="0" smtClean="0"/>
+              <a:t> </a:t>
+            </a:r>
+            <a:endParaRPr lang="en-US" altLang="zh-CN" i="1" dirty="0" smtClean="0"/>
+          </a:p>
+          <a:p>
+            <a:endParaRPr lang="en-US" i="1" dirty="0" smtClean="0"/>
+          </a:p>
+          <a:p>
+            <a:endParaRPr lang="en-US" i="1" dirty="0"/>
+          </a:p>
+          <a:p>
+            <a:endParaRPr lang="en-US" i="1" dirty="0" smtClean="0"/>
+          </a:p>
+          <a:p>
+            <a:r>
+              <a:rPr lang="en-US" i="1" dirty="0" smtClean="0"/>
+              <a:t>d</a:t>
+            </a:r>
+            <a:r>
+              <a:rPr lang="zh-CN" altLang="en-US" i="1" dirty="0" smtClean="0"/>
+              <a:t> </a:t>
+            </a:r>
+            <a:r>
+              <a:rPr lang="zh-CN" altLang="zh-CN" dirty="0" smtClean="0"/>
+              <a:t>=</a:t>
+            </a:r>
+            <a:r>
+              <a:rPr lang="en-US" altLang="zh-CN" dirty="0" smtClean="0"/>
+              <a:t>0.2,</a:t>
+            </a:r>
+            <a:r>
+              <a:rPr lang="zh-CN" altLang="en-US" dirty="0" smtClean="0"/>
+              <a:t> </a:t>
+            </a:r>
+            <a:r>
+              <a:rPr lang="en-US" altLang="zh-CN" dirty="0" smtClean="0"/>
+              <a:t>small</a:t>
+            </a:r>
+            <a:r>
+              <a:rPr lang="zh-CN" altLang="en-US" dirty="0" smtClean="0"/>
+              <a:t> </a:t>
+            </a:r>
+            <a:r>
+              <a:rPr lang="en-US" altLang="zh-CN" dirty="0" smtClean="0"/>
+              <a:t>effect</a:t>
+            </a:r>
+            <a:endParaRPr lang="en-US" i="1" dirty="0"/>
+          </a:p>
+          <a:p>
+            <a:r>
+              <a:rPr lang="en-US" i="1" dirty="0"/>
+              <a:t>d</a:t>
+            </a:r>
+            <a:r>
+              <a:rPr lang="zh-CN" altLang="en-US" i="1" dirty="0"/>
+              <a:t> </a:t>
+            </a:r>
+            <a:r>
+              <a:rPr lang="zh-CN" altLang="zh-CN" dirty="0"/>
+              <a:t>=</a:t>
+            </a:r>
+            <a:r>
+              <a:rPr lang="en-US" altLang="zh-CN" dirty="0" smtClean="0"/>
+              <a:t>0.</a:t>
+            </a:r>
+            <a:r>
+              <a:rPr lang="en-US" altLang="zh-CN" dirty="0" smtClean="0"/>
+              <a:t>5</a:t>
+            </a:r>
+            <a:r>
+              <a:rPr lang="en-US" altLang="zh-CN" dirty="0" smtClean="0"/>
+              <a:t>,</a:t>
+            </a:r>
+            <a:r>
+              <a:rPr lang="zh-CN" altLang="en-US" dirty="0" smtClean="0"/>
+              <a:t> </a:t>
+            </a:r>
+            <a:r>
+              <a:rPr lang="en-US" altLang="zh-CN" dirty="0" smtClean="0"/>
+              <a:t>medium</a:t>
+            </a:r>
+            <a:r>
+              <a:rPr lang="zh-CN" altLang="en-US" dirty="0" smtClean="0"/>
+              <a:t> </a:t>
+            </a:r>
+            <a:r>
+              <a:rPr lang="en-US" altLang="zh-CN" dirty="0" smtClean="0"/>
+              <a:t>effect</a:t>
+            </a:r>
+            <a:endParaRPr lang="en-US" i="1" dirty="0"/>
+          </a:p>
+          <a:p>
+            <a:r>
+              <a:rPr lang="en-US" i="1" dirty="0"/>
+              <a:t>d</a:t>
+            </a:r>
+            <a:r>
+              <a:rPr lang="zh-CN" altLang="en-US" i="1" dirty="0"/>
+              <a:t> </a:t>
+            </a:r>
+            <a:r>
+              <a:rPr lang="zh-CN" altLang="zh-CN" dirty="0"/>
+              <a:t>=</a:t>
+            </a:r>
+            <a:r>
+              <a:rPr lang="en-US" altLang="zh-CN" dirty="0" smtClean="0"/>
+              <a:t>0.</a:t>
+            </a:r>
+            <a:r>
+              <a:rPr lang="en-US" altLang="zh-CN" dirty="0" smtClean="0"/>
+              <a:t>8</a:t>
+            </a:r>
+            <a:r>
+              <a:rPr lang="en-US" altLang="zh-CN" dirty="0" smtClean="0"/>
+              <a:t>,</a:t>
+            </a:r>
+            <a:r>
+              <a:rPr lang="zh-CN" altLang="en-US" dirty="0" smtClean="0"/>
+              <a:t> </a:t>
+            </a:r>
+            <a:r>
+              <a:rPr lang="en-US" altLang="zh-CN" dirty="0" smtClean="0"/>
+              <a:t>large</a:t>
+            </a:r>
+            <a:r>
+              <a:rPr lang="zh-CN" altLang="en-US" dirty="0" smtClean="0"/>
+              <a:t> </a:t>
+            </a:r>
+            <a:r>
+              <a:rPr lang="en-US" altLang="zh-CN" dirty="0" smtClean="0"/>
+              <a:t>effect</a:t>
+            </a:r>
+            <a:endParaRPr lang="en-US" i="1" dirty="0"/>
+          </a:p>
+          <a:p>
+            <a:endParaRPr lang="en-US" i="1" dirty="0"/>
+          </a:p>
+        </p:txBody>
+      </p:sp>
+      <p:sp>
+        <p:nvSpPr>
+          <p:cNvPr id="4" name="Slide Number Placeholder 3"/>
+          <p:cNvSpPr>
+            <a:spLocks noGrp="1"/>
+          </p:cNvSpPr>
+          <p:nvPr>
+            <p:ph type="sldNum" sz="quarter" idx="12"/>
+          </p:nvPr>
+        </p:nvSpPr>
+        <p:spPr/>
+        <p:txBody>
+          <a:bodyPr/>
+          <a:lstStyle/>
+          <a:p>
+            <a:fld id="{19892AFD-08A7-429B-863F-010284A09610}" type="slidenum">
+              <a:rPr lang="en-US" smtClean="0"/>
+              <a:t>22</a:t>
+            </a:fld>
+            <a:endParaRPr lang="en-US"/>
+          </a:p>
+        </p:txBody>
+      </p:sp>
+      <p:pic>
+        <p:nvPicPr>
+          <p:cNvPr id="5" name="Picture 4" descr="Screen Shot 2018-04-12 at 2.06.07 PM.png"/>
+          <p:cNvPicPr>
+            <a:picLocks noChangeAspect="1"/>
+          </p:cNvPicPr>
+          <p:nvPr/>
+        </p:nvPicPr>
+        <p:blipFill>
+          <a:blip r:embed="rId3">
+            <a:extLst>
+              <a:ext uri="{28A0092B-C50C-407E-A947-70E740481C1C}">
+                <a14:useLocalDpi xmlns:a14="http://schemas.microsoft.com/office/drawing/2010/main" val="0"/>
+              </a:ext>
+            </a:extLst>
+          </a:blip>
+          <a:stretch>
+            <a:fillRect/>
+          </a:stretch>
+        </p:blipFill>
+        <p:spPr>
+          <a:xfrm>
+            <a:off x="2971800" y="1600200"/>
+            <a:ext cx="3619500" cy="1993900"/>
+          </a:xfrm>
+          <a:prstGeom prst="rect">
+            <a:avLst/>
+          </a:prstGeom>
+        </p:spPr>
+      </p:pic>
+    </p:spTree>
+    <p:extLst>
+      <p:ext uri="{BB962C8B-B14F-4D97-AF65-F5344CB8AC3E}">
+        <p14:creationId xmlns:p14="http://schemas.microsoft.com/office/powerpoint/2010/main" val="2757522343"/>
+      </p:ext>
+    </p:extLst>
+  </p:cSld>
+  <p:clrMapOvr>
+    <a:masterClrMapping/>
+  </p:clrMapOvr>
+</p:sld>
+</file>
+
+<file path=ppt/slides/slide23.xml><?xml version="1.0" encoding="utf-8"?>
+<p:sld xmlns:a="http://schemas.openxmlformats.org/drawingml/2006/main" xmlns:r="http://schemas.openxmlformats.org/officeDocument/2006/relationships" xmlns:p="http://schemas.openxmlformats.org/presentationml/2006/main">
+  <p:cSld>
+    <p:spTree>
+      <p:nvGrpSpPr>
+        <p:cNvPr id="1" name=""/>
+        <p:cNvGrpSpPr/>
+        <p:nvPr/>
+      </p:nvGrpSpPr>
+      <p:grpSpPr>
+        <a:xfrm>
+          <a:off x="0" y="0"/>
+          <a:ext cx="0" cy="0"/>
+          <a:chOff x="0" y="0"/>
+          <a:chExt cx="0" cy="0"/>
+        </a:xfrm>
+      </p:grpSpPr>
+      <p:sp>
+        <p:nvSpPr>
           <p:cNvPr id="31746" name="Rectangle 3"/>
           <p:cNvSpPr>
             <a:spLocks noGrp="1" noChangeArrowheads="1"/>
@@ -12470,7 +12789,7 @@
           <a:p>
             <a:fld id="{19892AFD-08A7-429B-863F-010284A09610}" type="slidenum">
               <a:rPr lang="en-US" smtClean="0"/>
-              <a:t>22</a:t>
+              <a:t>23</a:t>
             </a:fld>
             <a:endParaRPr lang="en-US"/>
           </a:p>
@@ -12490,7 +12809,7 @@
 </p:sld>
 </file>
 
-<file path=ppt/slides/slide23.xml><?xml version="1.0" encoding="utf-8"?>
+<file path=ppt/slides/slide24.xml><?xml version="1.0" encoding="utf-8"?>
 <p:sld xmlns:a="http://schemas.openxmlformats.org/drawingml/2006/main" xmlns:r="http://schemas.openxmlformats.org/officeDocument/2006/relationships" xmlns:p="http://schemas.openxmlformats.org/presentationml/2006/main">
   <p:cSld>
     <p:spTree>
@@ -13116,7 +13435,7 @@
           <a:graphicData uri="http://schemas.openxmlformats.org/presentationml/2006/ole">
             <mc:AlternateContent xmlns:mc="http://schemas.openxmlformats.org/markup-compatibility/2006">
               <mc:Choice xmlns:v="urn:schemas-microsoft-com:vml" Requires="v">
-                <p:oleObj spid="_x0000_s9281" name="Bitmap Image" r:id="rId4" imgW="2734057" imgH="3142857" progId="Paint.Picture">
+                <p:oleObj spid="_x0000_s9287" name="Bitmap Image" r:id="rId4" imgW="2734057" imgH="3142857" progId="Paint.Picture">
                   <p:embed/>
                 </p:oleObj>
               </mc:Choice>
@@ -13210,7 +13529,7 @@
           <a:p>
             <a:fld id="{19892AFD-08A7-429B-863F-010284A09610}" type="slidenum">
               <a:rPr lang="en-US" smtClean="0"/>
-              <a:t>23</a:t>
+              <a:t>24</a:t>
             </a:fld>
             <a:endParaRPr lang="en-US"/>
           </a:p>
@@ -13230,7 +13549,7 @@
 </p:sld>
 </file>
 
-<file path=ppt/slides/slide24.xml><?xml version="1.0" encoding="utf-8"?>
+<file path=ppt/slides/slide25.xml><?xml version="1.0" encoding="utf-8"?>
 <p:sld xmlns:a="http://schemas.openxmlformats.org/drawingml/2006/main" xmlns:r="http://schemas.openxmlformats.org/officeDocument/2006/relationships" xmlns:p="http://schemas.openxmlformats.org/presentationml/2006/main">
   <p:cSld>
     <p:spTree>
@@ -13868,7 +14187,7 @@
           <a:p>
             <a:fld id="{19892AFD-08A7-429B-863F-010284A09610}" type="slidenum">
               <a:rPr lang="en-US" smtClean="0"/>
-              <a:t>24</a:t>
+              <a:t>25</a:t>
             </a:fld>
             <a:endParaRPr lang="en-US"/>
           </a:p>
@@ -13888,7 +14207,7 @@
 </p:sld>
 </file>
 
-<file path=ppt/slides/slide25.xml><?xml version="1.0" encoding="utf-8"?>
+<file path=ppt/slides/slide26.xml><?xml version="1.0" encoding="utf-8"?>
 <p:sld xmlns:a="http://schemas.openxmlformats.org/drawingml/2006/main" xmlns:r="http://schemas.openxmlformats.org/officeDocument/2006/relationships" xmlns:p="http://schemas.openxmlformats.org/presentationml/2006/main">
   <p:cSld>
     <p:spTree>
@@ -14708,7 +15027,7 @@
           <a:graphicData uri="http://schemas.openxmlformats.org/presentationml/2006/ole">
             <mc:AlternateContent xmlns:mc="http://schemas.openxmlformats.org/markup-compatibility/2006">
               <mc:Choice xmlns:v="urn:schemas-microsoft-com:vml" Requires="v">
-                <p:oleObj spid="_x0000_s10305" name="Bitmap Image" r:id="rId4" imgW="5904762" imgH="2085714" progId="Paint.Picture">
+                <p:oleObj spid="_x0000_s10311" name="Bitmap Image" r:id="rId4" imgW="5904762" imgH="2085714" progId="Paint.Picture">
                   <p:embed/>
                 </p:oleObj>
               </mc:Choice>
@@ -14802,7 +15121,7 @@
           <a:p>
             <a:fld id="{19892AFD-08A7-429B-863F-010284A09610}" type="slidenum">
               <a:rPr lang="en-US" smtClean="0"/>
-              <a:t>25</a:t>
+              <a:t>26</a:t>
             </a:fld>
             <a:endParaRPr lang="en-US"/>
           </a:p>
@@ -14822,7 +15141,7 @@
 </p:sld>
 </file>
 
-<file path=ppt/slides/slide26.xml><?xml version="1.0" encoding="utf-8"?>
+<file path=ppt/slides/slide27.xml><?xml version="1.0" encoding="utf-8"?>
 <p:sld xmlns:a="http://schemas.openxmlformats.org/drawingml/2006/main" xmlns:r="http://schemas.openxmlformats.org/officeDocument/2006/relationships" xmlns:p="http://schemas.openxmlformats.org/presentationml/2006/main">
   <p:cSld>
     <p:spTree>
@@ -15656,7 +15975,7 @@
           <a:p>
             <a:fld id="{19892AFD-08A7-429B-863F-010284A09610}" type="slidenum">
               <a:rPr lang="en-US" smtClean="0"/>
-              <a:t>26</a:t>
+              <a:t>27</a:t>
             </a:fld>
             <a:endParaRPr lang="en-US"/>
           </a:p>
@@ -15676,7 +15995,7 @@
 </p:sld>
 </file>
 
-<file path=ppt/slides/slide27.xml><?xml version="1.0" encoding="utf-8"?>
+<file path=ppt/slides/slide28.xml><?xml version="1.0" encoding="utf-8"?>
 <p:sld xmlns:a="http://schemas.openxmlformats.org/drawingml/2006/main" xmlns:r="http://schemas.openxmlformats.org/officeDocument/2006/relationships" xmlns:p="http://schemas.openxmlformats.org/presentationml/2006/main">
   <p:cSld>
     <p:spTree>
@@ -16314,7 +16633,7 @@
           <a:p>
             <a:fld id="{19892AFD-08A7-429B-863F-010284A09610}" type="slidenum">
               <a:rPr lang="en-US" smtClean="0"/>
-              <a:t>27</a:t>
+              <a:t>28</a:t>
             </a:fld>
             <a:endParaRPr lang="en-US"/>
           </a:p>
@@ -16331,155 +16650,6 @@
     <a:masterClrMapping/>
   </p:clrMapOvr>
   <p:transition xmlns:p14="http://schemas.microsoft.com/office/powerpoint/2010/main"/>
-</p:sld>
-</file>
-
-<file path=ppt/slides/slide28.xml><?xml version="1.0" encoding="utf-8"?>
-<p:sld xmlns:a="http://schemas.openxmlformats.org/drawingml/2006/main" xmlns:r="http://schemas.openxmlformats.org/officeDocument/2006/relationships" xmlns:p="http://schemas.openxmlformats.org/presentationml/2006/main">
-  <p:cSld>
-    <p:spTree>
-      <p:nvGrpSpPr>
-        <p:cNvPr id="1" name=""/>
-        <p:cNvGrpSpPr/>
-        <p:nvPr/>
-      </p:nvGrpSpPr>
-      <p:grpSpPr>
-        <a:xfrm>
-          <a:off x="0" y="0"/>
-          <a:ext cx="0" cy="0"/>
-          <a:chOff x="0" y="0"/>
-          <a:chExt cx="0" cy="0"/>
-        </a:xfrm>
-      </p:grpSpPr>
-      <p:sp>
-        <p:nvSpPr>
-          <p:cNvPr id="3" name="Title 2"/>
-          <p:cNvSpPr>
-            <a:spLocks noGrp="1"/>
-          </p:cNvSpPr>
-          <p:nvPr>
-            <p:ph type="title"/>
-          </p:nvPr>
-        </p:nvSpPr>
-        <p:spPr/>
-        <p:txBody>
-          <a:bodyPr/>
-          <a:lstStyle/>
-          <a:p>
-            <a:r>
-              <a:rPr lang="en-US" dirty="0" smtClean="0"/>
-              <a:t>Independent sample T-Test</a:t>
-            </a:r>
-            <a:endParaRPr lang="en-US" dirty="0"/>
-          </a:p>
-        </p:txBody>
-      </p:sp>
-      <p:sp>
-        <p:nvSpPr>
-          <p:cNvPr id="4" name="Content Placeholder 3"/>
-          <p:cNvSpPr>
-            <a:spLocks noGrp="1"/>
-          </p:cNvSpPr>
-          <p:nvPr>
-            <p:ph idx="1"/>
-          </p:nvPr>
-        </p:nvSpPr>
-        <p:spPr/>
-        <p:txBody>
-          <a:bodyPr>
-            <a:normAutofit fontScale="77500" lnSpcReduction="20000"/>
-          </a:bodyPr>
-          <a:lstStyle/>
-          <a:p>
-            <a:r>
-              <a:rPr lang="en-US" b="1" dirty="0" err="1"/>
-              <a:t>IntroQ</a:t>
-            </a:r>
-            <a:r>
-              <a:rPr lang="en-US" b="1" dirty="0"/>
-              <a:t> Questionnaire</a:t>
-            </a:r>
-            <a:endParaRPr lang="en-US" dirty="0"/>
-          </a:p>
-          <a:p>
-            <a:r>
-              <a:rPr lang="en-US" dirty="0"/>
-              <a:t> </a:t>
-            </a:r>
-          </a:p>
-          <a:p>
-            <a:r>
-              <a:rPr lang="en-US" dirty="0"/>
-              <a:t>At the beginning of each semester, I ask each student to answer on paper (no names) each of these questions.  I explain that nobody is required to do this, but that the information would be handy for us to use to learn how to do basic descriptive statistics.</a:t>
-            </a:r>
-          </a:p>
-          <a:p>
-            <a:r>
-              <a:rPr lang="en-US" dirty="0"/>
-              <a:t> </a:t>
-            </a:r>
-          </a:p>
-          <a:p>
-            <a:r>
-              <a:rPr lang="en-US" dirty="0"/>
-              <a:t>	A.  What is your sex (gender)?  Female (1) or Male (2)</a:t>
-            </a:r>
-          </a:p>
-          <a:p>
-            <a:r>
-              <a:rPr lang="en-US" dirty="0"/>
-              <a:t> </a:t>
-            </a:r>
-          </a:p>
-          <a:p>
-            <a:r>
-              <a:rPr lang="en-US" dirty="0"/>
-              <a:t>	B.  What is the height </a:t>
-            </a:r>
-            <a:r>
-              <a:rPr lang="en-US" b="1" dirty="0"/>
-              <a:t>in inches</a:t>
-            </a:r>
-            <a:r>
-              <a:rPr lang="en-US" dirty="0"/>
-              <a:t> of your ideal mate?</a:t>
-            </a:r>
-          </a:p>
-        </p:txBody>
-      </p:sp>
-      <p:sp>
-        <p:nvSpPr>
-          <p:cNvPr id="2" name="Slide Number Placeholder 1"/>
-          <p:cNvSpPr>
-            <a:spLocks noGrp="1"/>
-          </p:cNvSpPr>
-          <p:nvPr>
-            <p:ph type="sldNum" sz="quarter" idx="12"/>
-          </p:nvPr>
-        </p:nvSpPr>
-        <p:spPr/>
-        <p:txBody>
-          <a:bodyPr/>
-          <a:lstStyle/>
-          <a:p>
-            <a:fld id="{19892AFD-08A7-429B-863F-010284A09610}" type="slidenum">
-              <a:rPr lang="en-US" smtClean="0"/>
-              <a:t>28</a:t>
-            </a:fld>
-            <a:endParaRPr lang="en-US"/>
-          </a:p>
-        </p:txBody>
-      </p:sp>
-    </p:spTree>
-    <p:extLst>
-      <p:ext uri="{BB962C8B-B14F-4D97-AF65-F5344CB8AC3E}">
-        <p14:creationId xmlns:p14="http://schemas.microsoft.com/office/powerpoint/2010/main" val="1280374005"/>
-      </p:ext>
-    </p:extLst>
-  </p:cSld>
-  <p:clrMapOvr>
-    <a:masterClrMapping/>
-  </p:clrMapOvr>
 </p:sld>
 </file>
 
@@ -16517,7 +16687,7 @@
           <a:p>
             <a:r>
               <a:rPr lang="en-US" dirty="0" smtClean="0"/>
-              <a:t>Independent sample T-Test in R</a:t>
+              <a:t>Independent sample T-Test</a:t>
             </a:r>
             <a:endParaRPr lang="en-US" dirty="0"/>
           </a:p>
@@ -16536,175 +16706,63 @@
         <p:spPr/>
         <p:txBody>
           <a:bodyPr>
-            <a:normAutofit fontScale="70000" lnSpcReduction="20000"/>
+            <a:normAutofit fontScale="77500" lnSpcReduction="20000"/>
           </a:bodyPr>
           <a:lstStyle/>
           <a:p>
             <a:r>
+              <a:rPr lang="en-US" b="1" dirty="0" err="1"/>
+              <a:t>IntroQ</a:t>
+            </a:r>
+            <a:r>
+              <a:rPr lang="en-US" b="1" dirty="0"/>
+              <a:t> Questionnaire</a:t>
+            </a:r>
+            <a:endParaRPr lang="en-US" dirty="0"/>
+          </a:p>
+          <a:p>
+            <a:r>
               <a:rPr lang="en-US" dirty="0"/>
-              <a:t>#Independent Samples T Tests with R</a:t>
+              <a:t> </a:t>
             </a:r>
           </a:p>
           <a:p>
             <a:r>
               <a:rPr lang="en-US" dirty="0"/>
-              <a:t>#http://</a:t>
-            </a:r>
-            <a:r>
-              <a:rPr lang="en-US" dirty="0" err="1"/>
-              <a:t>core.ecu.edu</a:t>
-            </a:r>
+              <a:t>At the beginning of each semester, I ask each student to answer on paper (no names) each of these questions.  I explain that nobody is required to do this, but that the information would be handy for us to use to learn how to do basic descriptive statistics.</a:t>
+            </a:r>
+          </a:p>
+          <a:p>
             <a:r>
               <a:rPr lang="en-US" dirty="0"/>
-              <a:t>/</a:t>
-            </a:r>
-            <a:r>
-              <a:rPr lang="en-US" dirty="0" err="1"/>
-              <a:t>psyc</a:t>
-            </a:r>
+              <a:t> </a:t>
+            </a:r>
+          </a:p>
+          <a:p>
             <a:r>
               <a:rPr lang="en-US" dirty="0"/>
-              <a:t>/</a:t>
-            </a:r>
-            <a:r>
-              <a:rPr lang="en-US" dirty="0" err="1"/>
-              <a:t>wuenschk</a:t>
-            </a:r>
+              <a:t>	A.  What is your sex (gender)?  Female (1) or Male (2)</a:t>
+            </a:r>
+          </a:p>
+          <a:p>
             <a:r>
               <a:rPr lang="en-US" dirty="0"/>
-              <a:t>/R-Lessons/R-</a:t>
-            </a:r>
-            <a:r>
-              <a:rPr lang="en-US" dirty="0" err="1"/>
-              <a:t>t_Independent</a:t>
-            </a:r>
+              <a:t> </a:t>
+            </a:r>
+          </a:p>
+          <a:p>
             <a:r>
               <a:rPr lang="en-US" dirty="0"/>
-              <a:t>-</a:t>
-            </a:r>
-            <a:r>
-              <a:rPr lang="en-US" dirty="0" err="1"/>
-              <a:t>Samples.pdf</a:t>
-            </a:r>
-            <a:endParaRPr lang="en-US" dirty="0"/>
-          </a:p>
-          <a:p>
-            <a:r>
-              <a:rPr lang="en-US" dirty="0" smtClean="0"/>
-              <a:t>#</a:t>
-            </a:r>
-            <a:r>
-              <a:rPr lang="en-US" dirty="0" err="1"/>
-              <a:t>install.packages</a:t>
+              <a:t>	B.  What is the height </a:t>
+            </a:r>
+            <a:r>
+              <a:rPr lang="en-US" b="1" dirty="0"/>
+              <a:t>in inches</a:t>
             </a:r>
             <a:r>
               <a:rPr lang="en-US" dirty="0"/>
-              <a:t>("psych")</a:t>
-            </a:r>
-          </a:p>
-          <a:p>
-            <a:endParaRPr lang="en-US" dirty="0"/>
-          </a:p>
-          <a:p>
-            <a:r>
-              <a:rPr lang="en-US" dirty="0"/>
-              <a:t>library(psych)</a:t>
-            </a:r>
-          </a:p>
-          <a:p>
-            <a:r>
-              <a:rPr lang="en-US" dirty="0" err="1"/>
-              <a:t>introq</a:t>
-            </a:r>
-            <a:r>
-              <a:rPr lang="en-US" dirty="0"/>
-              <a:t> &lt;- </a:t>
-            </a:r>
-            <a:r>
-              <a:rPr lang="en-US" dirty="0" err="1"/>
-              <a:t>read.table</a:t>
-            </a:r>
-            <a:r>
-              <a:rPr lang="en-US" dirty="0"/>
-              <a:t>("/Users/</a:t>
-            </a:r>
-            <a:r>
-              <a:rPr lang="en-US" dirty="0" err="1"/>
-              <a:t>hejibo</a:t>
-            </a:r>
-            <a:r>
-              <a:rPr lang="en-US" dirty="0"/>
-              <a:t>/Documents/Courses to teach /PSY 301 Psychological Statistics course/Psychological-Statistics/Lecture 14_Independent t-test/R independent sample t-test/</a:t>
-            </a:r>
-            <a:r>
-              <a:rPr lang="en-US" dirty="0" err="1"/>
-              <a:t>IntroQ.csv</a:t>
-            </a:r>
-            <a:r>
-              <a:rPr lang="en-US" dirty="0"/>
-              <a:t>", header=TRUE, </a:t>
-            </a:r>
-            <a:r>
-              <a:rPr lang="en-US" dirty="0" err="1"/>
-              <a:t>sep</a:t>
-            </a:r>
-            <a:r>
-              <a:rPr lang="en-US" dirty="0"/>
-              <a:t>=",")</a:t>
-            </a:r>
-          </a:p>
-          <a:p>
-            <a:r>
-              <a:rPr lang="en-US" dirty="0" err="1"/>
-              <a:t>describeBy</a:t>
-            </a:r>
-            <a:r>
-              <a:rPr lang="en-US" dirty="0"/>
-              <a:t>(</a:t>
-            </a:r>
-            <a:r>
-              <a:rPr lang="en-US" dirty="0" err="1"/>
-              <a:t>introq$Ideal</a:t>
-            </a:r>
-            <a:r>
-              <a:rPr lang="en-US" dirty="0"/>
-              <a:t>, </a:t>
-            </a:r>
-            <a:r>
-              <a:rPr lang="en-US" dirty="0" err="1"/>
-              <a:t>introq$Gender</a:t>
-            </a:r>
-            <a:r>
-              <a:rPr lang="en-US" dirty="0"/>
-              <a:t>)</a:t>
-            </a:r>
-          </a:p>
-          <a:p>
-            <a:r>
-              <a:rPr lang="en-US" dirty="0" err="1"/>
-              <a:t>t.test</a:t>
-            </a:r>
-            <a:r>
-              <a:rPr lang="en-US" dirty="0"/>
-              <a:t>(</a:t>
-            </a:r>
-            <a:r>
-              <a:rPr lang="en-US" dirty="0" err="1"/>
-              <a:t>introq$Ideal</a:t>
-            </a:r>
-            <a:r>
-              <a:rPr lang="en-US" dirty="0"/>
-              <a:t> ~ </a:t>
-            </a:r>
-            <a:r>
-              <a:rPr lang="en-US" dirty="0" err="1"/>
-              <a:t>introq$Gender</a:t>
-            </a:r>
-            <a:r>
-              <a:rPr lang="en-US" dirty="0" smtClean="0"/>
-              <a:t>)</a:t>
-            </a:r>
-            <a:endParaRPr lang="en-US" dirty="0"/>
+              <a:t> of your ideal mate?</a:t>
+            </a:r>
           </a:p>
         </p:txBody>
       </p:sp>
@@ -16734,7 +16792,7 @@
     </p:spTree>
     <p:extLst>
       <p:ext uri="{BB962C8B-B14F-4D97-AF65-F5344CB8AC3E}">
-        <p14:creationId xmlns:p14="http://schemas.microsoft.com/office/powerpoint/2010/main" val="2153551404"/>
+        <p14:creationId xmlns:p14="http://schemas.microsoft.com/office/powerpoint/2010/main" val="1280374005"/>
       </p:ext>
     </p:extLst>
   </p:cSld>
@@ -17142,7 +17200,7 @@
         <p:spPr/>
         <p:txBody>
           <a:bodyPr>
-            <a:normAutofit fontScale="40000" lnSpcReduction="20000"/>
+            <a:normAutofit fontScale="70000" lnSpcReduction="20000"/>
           </a:bodyPr>
           <a:lstStyle/>
           <a:p>
@@ -17196,7 +17254,7 @@
           </a:p>
           <a:p>
             <a:r>
-              <a:rPr lang="en-US" dirty="0"/>
+              <a:rPr lang="en-US" dirty="0" smtClean="0"/>
               <a:t>#</a:t>
             </a:r>
             <a:r>
@@ -17205,50 +17263,6 @@
             </a:r>
             <a:r>
               <a:rPr lang="en-US" dirty="0"/>
-              <a:t>("</a:t>
-            </a:r>
-            <a:r>
-              <a:rPr lang="en-US" dirty="0" err="1"/>
-              <a:t>lsr</a:t>
-            </a:r>
-            <a:r>
-              <a:rPr lang="en-US" dirty="0"/>
-              <a:t>")</a:t>
-            </a:r>
-          </a:p>
-          <a:p>
-            <a:r>
-              <a:rPr lang="en-US" dirty="0"/>
-              <a:t>#</a:t>
-            </a:r>
-            <a:r>
-              <a:rPr lang="en-US" dirty="0" err="1"/>
-              <a:t>install.packages</a:t>
-            </a:r>
-            <a:r>
-              <a:rPr lang="en-US" dirty="0"/>
-              <a:t>("</a:t>
-            </a:r>
-            <a:r>
-              <a:rPr lang="en-US" dirty="0" err="1"/>
-              <a:t>compute.es</a:t>
-            </a:r>
-            <a:r>
-              <a:rPr lang="en-US" dirty="0"/>
-              <a:t>")</a:t>
-            </a:r>
-          </a:p>
-          <a:p>
-            <a:r>
-              <a:rPr lang="en-US" dirty="0"/>
-              <a:t>#</a:t>
-            </a:r>
-            <a:r>
-              <a:rPr lang="en-US" dirty="0" err="1"/>
-              <a:t>install.packages</a:t>
-            </a:r>
-            <a:r>
-              <a:rPr lang="en-US" dirty="0"/>
               <a:t>("psych")</a:t>
             </a:r>
           </a:p>
@@ -17351,92 +17365,9 @@
               <a:t>introq$Gender</a:t>
             </a:r>
             <a:r>
-              <a:rPr lang="en-US" dirty="0"/>
+              <a:rPr lang="en-US" dirty="0" smtClean="0"/>
               <a:t>)</a:t>
             </a:r>
-          </a:p>
-          <a:p>
-            <a:endParaRPr lang="en-US" dirty="0"/>
-          </a:p>
-          <a:p>
-            <a:r>
-              <a:rPr lang="en-US" dirty="0"/>
-              <a:t>### additional good to know - </a:t>
-            </a:r>
-          </a:p>
-          <a:p>
-            <a:r>
-              <a:rPr lang="en-US" dirty="0"/>
-              <a:t>### effect size for independent sample t-test</a:t>
-            </a:r>
-          </a:p>
-          <a:p>
-            <a:endParaRPr lang="en-US" dirty="0"/>
-          </a:p>
-          <a:p>
-            <a:r>
-              <a:rPr lang="en-US" dirty="0"/>
-              <a:t>library(</a:t>
-            </a:r>
-            <a:r>
-              <a:rPr lang="en-US" dirty="0" err="1"/>
-              <a:t>lsr</a:t>
-            </a:r>
-            <a:r>
-              <a:rPr lang="en-US" dirty="0"/>
-              <a:t>)</a:t>
-            </a:r>
-          </a:p>
-          <a:p>
-            <a:r>
-              <a:rPr lang="en-US" dirty="0" err="1"/>
-              <a:t>cohensD</a:t>
-            </a:r>
-            <a:r>
-              <a:rPr lang="en-US" dirty="0"/>
-              <a:t>(</a:t>
-            </a:r>
-            <a:r>
-              <a:rPr lang="en-US" dirty="0" err="1"/>
-              <a:t>introq$Ideal</a:t>
-            </a:r>
-            <a:r>
-              <a:rPr lang="en-US" dirty="0"/>
-              <a:t>~ </a:t>
-            </a:r>
-            <a:r>
-              <a:rPr lang="en-US" dirty="0" err="1"/>
-              <a:t>introq$Gender</a:t>
-            </a:r>
-            <a:r>
-              <a:rPr lang="en-US" dirty="0"/>
-              <a:t>)</a:t>
-            </a:r>
-          </a:p>
-          <a:p>
-            <a:r>
-              <a:rPr lang="en-US" dirty="0"/>
-              <a:t>library(</a:t>
-            </a:r>
-            <a:r>
-              <a:rPr lang="en-US" dirty="0" err="1"/>
-              <a:t>compute.es</a:t>
-            </a:r>
-            <a:r>
-              <a:rPr lang="en-US" dirty="0"/>
-              <a:t>)</a:t>
-            </a:r>
-          </a:p>
-          <a:p>
-            <a:r>
-              <a:rPr lang="en-US" dirty="0"/>
-              <a:t>des(d=1.487092, n.1=539, n.2=180)</a:t>
-            </a:r>
-          </a:p>
-          <a:p>
-            <a:pPr marL="0" indent="0">
-              <a:buNone/>
-            </a:pPr>
             <a:endParaRPr lang="en-US" dirty="0"/>
           </a:p>
         </p:txBody>
@@ -17467,7 +17398,7 @@
     </p:spTree>
     <p:extLst>
       <p:ext uri="{BB962C8B-B14F-4D97-AF65-F5344CB8AC3E}">
-        <p14:creationId xmlns:p14="http://schemas.microsoft.com/office/powerpoint/2010/main" val="2942064720"/>
+        <p14:creationId xmlns:p14="http://schemas.microsoft.com/office/powerpoint/2010/main" val="2153551404"/>
       </p:ext>
     </p:extLst>
   </p:cSld>
@@ -17511,8 +17442,320 @@
           <a:p>
             <a:r>
               <a:rPr lang="en-US" dirty="0" smtClean="0"/>
-              <a:t>Independent sample T-Test in SPSS</a:t>
-            </a:r>
+              <a:t>Independent sample T-Test in R</a:t>
+            </a:r>
+            <a:endParaRPr lang="en-US" dirty="0"/>
+          </a:p>
+        </p:txBody>
+      </p:sp>
+      <p:sp>
+        <p:nvSpPr>
+          <p:cNvPr id="4" name="Content Placeholder 3"/>
+          <p:cNvSpPr>
+            <a:spLocks noGrp="1"/>
+          </p:cNvSpPr>
+          <p:nvPr>
+            <p:ph idx="1"/>
+          </p:nvPr>
+        </p:nvSpPr>
+        <p:spPr/>
+        <p:txBody>
+          <a:bodyPr>
+            <a:normAutofit fontScale="40000" lnSpcReduction="20000"/>
+          </a:bodyPr>
+          <a:lstStyle/>
+          <a:p>
+            <a:r>
+              <a:rPr lang="en-US" dirty="0"/>
+              <a:t>#Independent Samples T Tests with R</a:t>
+            </a:r>
+          </a:p>
+          <a:p>
+            <a:r>
+              <a:rPr lang="en-US" dirty="0"/>
+              <a:t>#http://</a:t>
+            </a:r>
+            <a:r>
+              <a:rPr lang="en-US" dirty="0" err="1"/>
+              <a:t>core.ecu.edu</a:t>
+            </a:r>
+            <a:r>
+              <a:rPr lang="en-US" dirty="0"/>
+              <a:t>/</a:t>
+            </a:r>
+            <a:r>
+              <a:rPr lang="en-US" dirty="0" err="1"/>
+              <a:t>psyc</a:t>
+            </a:r>
+            <a:r>
+              <a:rPr lang="en-US" dirty="0"/>
+              <a:t>/</a:t>
+            </a:r>
+            <a:r>
+              <a:rPr lang="en-US" dirty="0" err="1"/>
+              <a:t>wuenschk</a:t>
+            </a:r>
+            <a:r>
+              <a:rPr lang="en-US" dirty="0"/>
+              <a:t>/R-Lessons/R-</a:t>
+            </a:r>
+            <a:r>
+              <a:rPr lang="en-US" dirty="0" err="1"/>
+              <a:t>t_Independent</a:t>
+            </a:r>
+            <a:r>
+              <a:rPr lang="en-US" dirty="0"/>
+              <a:t>-</a:t>
+            </a:r>
+            <a:r>
+              <a:rPr lang="en-US" dirty="0" err="1"/>
+              <a:t>Samples.pdf</a:t>
+            </a:r>
+            <a:endParaRPr lang="en-US" dirty="0"/>
+          </a:p>
+          <a:p>
+            <a:r>
+              <a:rPr lang="en-US" dirty="0"/>
+              <a:t>#</a:t>
+            </a:r>
+            <a:r>
+              <a:rPr lang="en-US" dirty="0" err="1"/>
+              <a:t>install.packages</a:t>
+            </a:r>
+            <a:r>
+              <a:rPr lang="en-US" dirty="0"/>
+              <a:t>("</a:t>
+            </a:r>
+            <a:r>
+              <a:rPr lang="en-US" dirty="0" err="1"/>
+              <a:t>lsr</a:t>
+            </a:r>
+            <a:r>
+              <a:rPr lang="en-US" dirty="0"/>
+              <a:t>")</a:t>
+            </a:r>
+          </a:p>
+          <a:p>
+            <a:r>
+              <a:rPr lang="en-US" dirty="0"/>
+              <a:t>#</a:t>
+            </a:r>
+            <a:r>
+              <a:rPr lang="en-US" dirty="0" err="1"/>
+              <a:t>install.packages</a:t>
+            </a:r>
+            <a:r>
+              <a:rPr lang="en-US" dirty="0"/>
+              <a:t>("</a:t>
+            </a:r>
+            <a:r>
+              <a:rPr lang="en-US" dirty="0" err="1"/>
+              <a:t>compute.es</a:t>
+            </a:r>
+            <a:r>
+              <a:rPr lang="en-US" dirty="0"/>
+              <a:t>")</a:t>
+            </a:r>
+          </a:p>
+          <a:p>
+            <a:r>
+              <a:rPr lang="en-US" dirty="0"/>
+              <a:t>#</a:t>
+            </a:r>
+            <a:r>
+              <a:rPr lang="en-US" dirty="0" err="1"/>
+              <a:t>install.packages</a:t>
+            </a:r>
+            <a:r>
+              <a:rPr lang="en-US" dirty="0"/>
+              <a:t>("psych")</a:t>
+            </a:r>
+          </a:p>
+          <a:p>
+            <a:endParaRPr lang="en-US" dirty="0"/>
+          </a:p>
+          <a:p>
+            <a:r>
+              <a:rPr lang="en-US" dirty="0"/>
+              <a:t>library(psych)</a:t>
+            </a:r>
+          </a:p>
+          <a:p>
+            <a:r>
+              <a:rPr lang="en-US" dirty="0" err="1"/>
+              <a:t>introq</a:t>
+            </a:r>
+            <a:r>
+              <a:rPr lang="en-US" dirty="0"/>
+              <a:t> &lt;- </a:t>
+            </a:r>
+            <a:r>
+              <a:rPr lang="en-US" dirty="0" err="1"/>
+              <a:t>read.table</a:t>
+            </a:r>
+            <a:r>
+              <a:rPr lang="en-US" dirty="0"/>
+              <a:t>("/Users/</a:t>
+            </a:r>
+            <a:r>
+              <a:rPr lang="en-US" dirty="0" err="1"/>
+              <a:t>hejibo</a:t>
+            </a:r>
+            <a:r>
+              <a:rPr lang="en-US" dirty="0"/>
+              <a:t>/Documents/Courses to teach /PSY 301 Psychological Statistics course/Psychological-Statistics/Lecture 14_Independent t-test/R independent sample t-test/</a:t>
+            </a:r>
+            <a:r>
+              <a:rPr lang="en-US" dirty="0" err="1"/>
+              <a:t>IntroQ.csv</a:t>
+            </a:r>
+            <a:r>
+              <a:rPr lang="en-US" dirty="0"/>
+              <a:t>", header=TRUE, </a:t>
+            </a:r>
+            <a:r>
+              <a:rPr lang="en-US" dirty="0" err="1"/>
+              <a:t>sep</a:t>
+            </a:r>
+            <a:r>
+              <a:rPr lang="en-US" dirty="0"/>
+              <a:t>=",")</a:t>
+            </a:r>
+          </a:p>
+          <a:p>
+            <a:r>
+              <a:rPr lang="en-US" dirty="0" err="1"/>
+              <a:t>describeBy</a:t>
+            </a:r>
+            <a:r>
+              <a:rPr lang="en-US" dirty="0"/>
+              <a:t>(</a:t>
+            </a:r>
+            <a:r>
+              <a:rPr lang="en-US" dirty="0" err="1"/>
+              <a:t>introq$Ideal</a:t>
+            </a:r>
+            <a:r>
+              <a:rPr lang="en-US" dirty="0"/>
+              <a:t>, </a:t>
+            </a:r>
+            <a:r>
+              <a:rPr lang="en-US" dirty="0" err="1"/>
+              <a:t>introq$Gender</a:t>
+            </a:r>
+            <a:r>
+              <a:rPr lang="en-US" dirty="0"/>
+              <a:t>)</a:t>
+            </a:r>
+          </a:p>
+          <a:p>
+            <a:r>
+              <a:rPr lang="en-US" dirty="0" err="1"/>
+              <a:t>t.test</a:t>
+            </a:r>
+            <a:r>
+              <a:rPr lang="en-US" dirty="0"/>
+              <a:t>(</a:t>
+            </a:r>
+            <a:r>
+              <a:rPr lang="en-US" dirty="0" err="1"/>
+              <a:t>introq$Ideal</a:t>
+            </a:r>
+            <a:r>
+              <a:rPr lang="en-US" dirty="0"/>
+              <a:t> ~ </a:t>
+            </a:r>
+            <a:r>
+              <a:rPr lang="en-US" dirty="0" err="1"/>
+              <a:t>introq$Gender</a:t>
+            </a:r>
+            <a:r>
+              <a:rPr lang="en-US" dirty="0"/>
+              <a:t>)</a:t>
+            </a:r>
+          </a:p>
+          <a:p>
+            <a:endParaRPr lang="en-US" dirty="0"/>
+          </a:p>
+          <a:p>
+            <a:r>
+              <a:rPr lang="en-US" dirty="0"/>
+              <a:t>### additional good to know - </a:t>
+            </a:r>
+          </a:p>
+          <a:p>
+            <a:r>
+              <a:rPr lang="en-US" dirty="0"/>
+              <a:t>### effect size for independent sample t-test</a:t>
+            </a:r>
+          </a:p>
+          <a:p>
+            <a:endParaRPr lang="en-US" dirty="0"/>
+          </a:p>
+          <a:p>
+            <a:r>
+              <a:rPr lang="en-US" dirty="0"/>
+              <a:t>library(</a:t>
+            </a:r>
+            <a:r>
+              <a:rPr lang="en-US" dirty="0" err="1"/>
+              <a:t>lsr</a:t>
+            </a:r>
+            <a:r>
+              <a:rPr lang="en-US" dirty="0"/>
+              <a:t>)</a:t>
+            </a:r>
+          </a:p>
+          <a:p>
+            <a:r>
+              <a:rPr lang="en-US" dirty="0" err="1"/>
+              <a:t>cohensD</a:t>
+            </a:r>
+            <a:r>
+              <a:rPr lang="en-US" dirty="0"/>
+              <a:t>(</a:t>
+            </a:r>
+            <a:r>
+              <a:rPr lang="en-US" dirty="0" err="1"/>
+              <a:t>introq$Ideal</a:t>
+            </a:r>
+            <a:r>
+              <a:rPr lang="en-US" dirty="0"/>
+              <a:t>~ </a:t>
+            </a:r>
+            <a:r>
+              <a:rPr lang="en-US" dirty="0" err="1"/>
+              <a:t>introq$Gender</a:t>
+            </a:r>
+            <a:r>
+              <a:rPr lang="en-US" dirty="0"/>
+              <a:t>)</a:t>
+            </a:r>
+          </a:p>
+          <a:p>
+            <a:r>
+              <a:rPr lang="en-US" dirty="0"/>
+              <a:t>library(</a:t>
+            </a:r>
+            <a:r>
+              <a:rPr lang="en-US" dirty="0" err="1"/>
+              <a:t>compute.es</a:t>
+            </a:r>
+            <a:r>
+              <a:rPr lang="en-US" dirty="0"/>
+              <a:t>)</a:t>
+            </a:r>
+          </a:p>
+          <a:p>
+            <a:r>
+              <a:rPr lang="en-US" dirty="0"/>
+              <a:t>des(d=1.487092, n.1=539, n.2=180)</a:t>
+            </a:r>
+          </a:p>
+          <a:p>
+            <a:pPr marL="0" indent="0">
+              <a:buNone/>
+            </a:pPr>
             <a:endParaRPr lang="en-US" dirty="0"/>
           </a:p>
         </p:txBody>
@@ -17535,6 +17778,82 @@
             <a:fld id="{19892AFD-08A7-429B-863F-010284A09610}" type="slidenum">
               <a:rPr lang="en-US" smtClean="0"/>
               <a:t>31</a:t>
+            </a:fld>
+            <a:endParaRPr lang="en-US"/>
+          </a:p>
+        </p:txBody>
+      </p:sp>
+    </p:spTree>
+    <p:extLst>
+      <p:ext uri="{BB962C8B-B14F-4D97-AF65-F5344CB8AC3E}">
+        <p14:creationId xmlns:p14="http://schemas.microsoft.com/office/powerpoint/2010/main" val="2942064720"/>
+      </p:ext>
+    </p:extLst>
+  </p:cSld>
+  <p:clrMapOvr>
+    <a:masterClrMapping/>
+  </p:clrMapOvr>
+</p:sld>
+</file>
+
+<file path=ppt/slides/slide32.xml><?xml version="1.0" encoding="utf-8"?>
+<p:sld xmlns:a="http://schemas.openxmlformats.org/drawingml/2006/main" xmlns:r="http://schemas.openxmlformats.org/officeDocument/2006/relationships" xmlns:p="http://schemas.openxmlformats.org/presentationml/2006/main">
+  <p:cSld>
+    <p:spTree>
+      <p:nvGrpSpPr>
+        <p:cNvPr id="1" name=""/>
+        <p:cNvGrpSpPr/>
+        <p:nvPr/>
+      </p:nvGrpSpPr>
+      <p:grpSpPr>
+        <a:xfrm>
+          <a:off x="0" y="0"/>
+          <a:ext cx="0" cy="0"/>
+          <a:chOff x="0" y="0"/>
+          <a:chExt cx="0" cy="0"/>
+        </a:xfrm>
+      </p:grpSpPr>
+      <p:sp>
+        <p:nvSpPr>
+          <p:cNvPr id="3" name="Title 2"/>
+          <p:cNvSpPr>
+            <a:spLocks noGrp="1"/>
+          </p:cNvSpPr>
+          <p:nvPr>
+            <p:ph type="title"/>
+          </p:nvPr>
+        </p:nvSpPr>
+        <p:spPr/>
+        <p:txBody>
+          <a:bodyPr/>
+          <a:lstStyle/>
+          <a:p>
+            <a:r>
+              <a:rPr lang="en-US" dirty="0" smtClean="0"/>
+              <a:t>Independent sample T-Test in SPSS</a:t>
+            </a:r>
+            <a:endParaRPr lang="en-US" dirty="0"/>
+          </a:p>
+        </p:txBody>
+      </p:sp>
+      <p:sp>
+        <p:nvSpPr>
+          <p:cNvPr id="2" name="Slide Number Placeholder 1"/>
+          <p:cNvSpPr>
+            <a:spLocks noGrp="1"/>
+          </p:cNvSpPr>
+          <p:nvPr>
+            <p:ph type="sldNum" sz="quarter" idx="12"/>
+          </p:nvPr>
+        </p:nvSpPr>
+        <p:spPr/>
+        <p:txBody>
+          <a:bodyPr/>
+          <a:lstStyle/>
+          <a:p>
+            <a:fld id="{19892AFD-08A7-429B-863F-010284A09610}" type="slidenum">
+              <a:rPr lang="en-US" smtClean="0"/>
+              <a:t>32</a:t>
             </a:fld>
             <a:endParaRPr lang="en-US"/>
           </a:p>
@@ -17583,7 +17902,7 @@
 </p:sld>
 </file>
 
-<file path=ppt/slides/slide32.xml><?xml version="1.0" encoding="utf-8"?>
+<file path=ppt/slides/slide33.xml><?xml version="1.0" encoding="utf-8"?>
 <p:sld xmlns:a="http://schemas.openxmlformats.org/drawingml/2006/main" xmlns:r="http://schemas.openxmlformats.org/officeDocument/2006/relationships" xmlns:p="http://schemas.openxmlformats.org/presentationml/2006/main">
   <p:cSld>
     <p:spTree>
@@ -17640,7 +17959,7 @@
           <a:p>
             <a:fld id="{19892AFD-08A7-429B-863F-010284A09610}" type="slidenum">
               <a:rPr lang="en-US" smtClean="0"/>
-              <a:t>32</a:t>
+              <a:t>33</a:t>
             </a:fld>
             <a:endParaRPr lang="en-US"/>
           </a:p>
@@ -17719,7 +18038,7 @@
 </p:sld>
 </file>
 
-<file path=ppt/slides/slide33.xml><?xml version="1.0" encoding="utf-8"?>
+<file path=ppt/slides/slide34.xml><?xml version="1.0" encoding="utf-8"?>
 <p:sld xmlns:a="http://schemas.openxmlformats.org/drawingml/2006/main" xmlns:r="http://schemas.openxmlformats.org/officeDocument/2006/relationships" xmlns:p="http://schemas.openxmlformats.org/presentationml/2006/main">
   <p:cSld>
     <p:spTree>
@@ -17776,7 +18095,7 @@
           <a:p>
             <a:fld id="{19892AFD-08A7-429B-863F-010284A09610}" type="slidenum">
               <a:rPr lang="en-US" smtClean="0"/>
-              <a:t>33</a:t>
+              <a:t>34</a:t>
             </a:fld>
             <a:endParaRPr lang="en-US"/>
           </a:p>
@@ -17825,7 +18144,7 @@
 </p:sld>
 </file>
 
-<file path=ppt/slides/slide34.xml><?xml version="1.0" encoding="utf-8"?>
+<file path=ppt/slides/slide35.xml><?xml version="1.0" encoding="utf-8"?>
 <p:sld xmlns:a="http://schemas.openxmlformats.org/drawingml/2006/main" xmlns:r="http://schemas.openxmlformats.org/officeDocument/2006/relationships" xmlns:p="http://schemas.openxmlformats.org/presentationml/2006/main">
   <p:cSld>
     <p:spTree>
@@ -17976,7 +18295,7 @@
           <a:p>
             <a:fld id="{19892AFD-08A7-429B-863F-010284A09610}" type="slidenum">
               <a:rPr lang="en-US" smtClean="0"/>
-              <a:t>34</a:t>
+              <a:t>35</a:t>
             </a:fld>
             <a:endParaRPr lang="en-US"/>
           </a:p>
@@ -17995,7 +18314,7 @@
 </p:sld>
 </file>
 
-<file path=ppt/slides/slide35.xml><?xml version="1.0" encoding="utf-8"?>
+<file path=ppt/slides/slide36.xml><?xml version="1.0" encoding="utf-8"?>
 <p:sld xmlns:a="http://schemas.openxmlformats.org/drawingml/2006/main" xmlns:r="http://schemas.openxmlformats.org/officeDocument/2006/relationships" xmlns:p="http://schemas.openxmlformats.org/presentationml/2006/main">
   <p:cSld>
     <p:spTree>
@@ -18165,7 +18484,7 @@
           <a:graphicData uri="http://schemas.openxmlformats.org/presentationml/2006/ole">
             <mc:AlternateContent xmlns:mc="http://schemas.openxmlformats.org/markup-compatibility/2006">
               <mc:Choice xmlns:v="urn:schemas-microsoft-com:vml" Requires="v">
-                <p:oleObj spid="_x0000_s11370" name="Equation" r:id="rId3" imgW="1155600" imgH="609480" progId="Equation.DSMT4">
+                <p:oleObj spid="_x0000_s11381" name="Equation" r:id="rId3" imgW="1155600" imgH="609480" progId="Equation.DSMT4">
                   <p:embed/>
                 </p:oleObj>
               </mc:Choice>
@@ -18222,7 +18541,7 @@
           <a:graphicData uri="http://schemas.openxmlformats.org/presentationml/2006/ole">
             <mc:AlternateContent xmlns:mc="http://schemas.openxmlformats.org/markup-compatibility/2006">
               <mc:Choice xmlns:v="urn:schemas-microsoft-com:vml" Requires="v">
-                <p:oleObj spid="_x0000_s11371" name="Equation" r:id="rId5" imgW="2361960" imgH="711000" progId="Equation.DSMT4">
+                <p:oleObj spid="_x0000_s11382" name="Equation" r:id="rId5" imgW="2361960" imgH="711000" progId="Equation.DSMT4">
                   <p:embed/>
                 </p:oleObj>
               </mc:Choice>
@@ -18281,7 +18600,7 @@
           <a:p>
             <a:fld id="{19892AFD-08A7-429B-863F-010284A09610}" type="slidenum">
               <a:rPr lang="en-US" smtClean="0"/>
-              <a:t>35</a:t>
+              <a:t>36</a:t>
             </a:fld>
             <a:endParaRPr lang="en-US"/>
           </a:p>
@@ -19167,7 +19486,7 @@
           <a:graphicData uri="http://schemas.openxmlformats.org/presentationml/2006/ole">
             <mc:AlternateContent xmlns:mc="http://schemas.openxmlformats.org/markup-compatibility/2006">
               <mc:Choice xmlns:v="urn:schemas-microsoft-com:vml" Requires="v">
-                <p:oleObj spid="_x0000_s1320" r:id="rId4" imgW="990600" imgH="457200" progId="Equation.DSMT4">
+                <p:oleObj spid="_x0000_s1341" r:id="rId4" imgW="990600" imgH="457200" progId="Equation.DSMT4">
                   <p:embed/>
                 </p:oleObj>
               </mc:Choice>
@@ -19295,7 +19614,7 @@
           <a:graphicData uri="http://schemas.openxmlformats.org/presentationml/2006/ole">
             <mc:AlternateContent xmlns:mc="http://schemas.openxmlformats.org/markup-compatibility/2006">
               <mc:Choice xmlns:v="urn:schemas-microsoft-com:vml" Requires="v">
-                <p:oleObj spid="_x0000_s1321" name="Equation" r:id="rId6" imgW="990360" imgH="457200" progId="Equation.DSMT4">
+                <p:oleObj spid="_x0000_s1342" name="Equation" r:id="rId6" imgW="990360" imgH="457200" progId="Equation.DSMT4">
                   <p:embed/>
                 </p:oleObj>
               </mc:Choice>
@@ -19378,7 +19697,7 @@
           <a:graphicData uri="http://schemas.openxmlformats.org/presentationml/2006/ole">
             <mc:AlternateContent xmlns:mc="http://schemas.openxmlformats.org/markup-compatibility/2006">
               <mc:Choice xmlns:v="urn:schemas-microsoft-com:vml" Requires="v">
-                <p:oleObj spid="_x0000_s1322" name="Equation" r:id="rId8" imgW="990360" imgH="457200" progId="Equation.DSMT4">
+                <p:oleObj spid="_x0000_s1343" name="Equation" r:id="rId8" imgW="990360" imgH="457200" progId="Equation.DSMT4">
                   <p:embed/>
                 </p:oleObj>
               </mc:Choice>
@@ -19461,7 +19780,7 @@
           <a:graphicData uri="http://schemas.openxmlformats.org/presentationml/2006/ole">
             <mc:AlternateContent xmlns:mc="http://schemas.openxmlformats.org/markup-compatibility/2006">
               <mc:Choice xmlns:v="urn:schemas-microsoft-com:vml" Requires="v">
-                <p:oleObj spid="_x0000_s1323" name="Equation" r:id="rId10" imgW="1498320" imgH="457200" progId="Equation.DSMT4">
+                <p:oleObj spid="_x0000_s1344" name="Equation" r:id="rId10" imgW="1498320" imgH="457200" progId="Equation.DSMT4">
                   <p:embed/>
                 </p:oleObj>
               </mc:Choice>

</xml_diff>